<commit_message>
adieu ma page de recrutement...
</commit_message>
<xml_diff>
--- a/PowerPoint.pptx
+++ b/PowerPoint.pptx
@@ -302,6 +302,11 @@
         <p15:guide id="1" orient="horz" pos="2129">
           <p15:clr>
             <a:srgbClr val="9AA0A6"/>
+          </p15:clr>
+        </p15:guide>
+        <p15:guide id="2" pos="2880">
+          <p15:clr>
+            <a:srgbClr val="A4A3A4"/>
           </p15:clr>
         </p15:guide>
       </p15:sldGuideLst>
@@ -23197,7 +23202,7 @@
         </p:nvSpPr>
         <p:spPr>
           <a:xfrm>
-            <a:off x="1391671" y="2164389"/>
+            <a:off x="1394465" y="2190766"/>
             <a:ext cx="1882076" cy="1671000"/>
           </a:xfrm>
           <a:prstGeom prst="rect">
@@ -23433,8 +23438,8 @@
         </p:nvSpPr>
         <p:spPr>
           <a:xfrm>
-            <a:off x="3547336" y="2170908"/>
-            <a:ext cx="1894116" cy="1205685"/>
+            <a:off x="3571240" y="2170908"/>
+            <a:ext cx="1870212" cy="2168798"/>
           </a:xfrm>
           <a:prstGeom prst="roundRect">
             <a:avLst>
@@ -23489,8 +23494,8 @@
         </p:nvSpPr>
         <p:spPr>
           <a:xfrm>
-            <a:off x="3630461" y="2068436"/>
-            <a:ext cx="1894116" cy="1152968"/>
+            <a:off x="3654365" y="2068436"/>
+            <a:ext cx="1870212" cy="2073970"/>
           </a:xfrm>
           <a:prstGeom prst="roundRect">
             <a:avLst>
@@ -23527,41 +23532,6 @@
           </a:p>
         </p:txBody>
       </p:sp>
-      <p:cxnSp>
-        <p:nvCxnSpPr>
-          <p:cNvPr id="46" name="Google Shape;2448;p41">
-            <a:extLst>
-              <a:ext uri="{FF2B5EF4-FFF2-40B4-BE49-F238E27FC236}">
-                <a16:creationId xmlns:a16="http://schemas.microsoft.com/office/drawing/2014/main" id="{2425AC1D-313D-4B2B-B60A-97A06DE684B2}"/>
-              </a:ext>
-            </a:extLst>
-          </p:cNvPr>
-          <p:cNvCxnSpPr>
-            <a:cxnSpLocks/>
-            <a:endCxn id="45" idx="0"/>
-          </p:cNvCxnSpPr>
-          <p:nvPr/>
-        </p:nvCxnSpPr>
-        <p:spPr>
-          <a:xfrm flipH="1">
-            <a:off x="4577519" y="1806536"/>
-            <a:ext cx="51192" cy="261900"/>
-          </a:xfrm>
-          <a:prstGeom prst="straightConnector1">
-            <a:avLst/>
-          </a:prstGeom>
-          <a:noFill/>
-          <a:ln w="9525" cap="flat" cmpd="sng">
-            <a:solidFill>
-              <a:schemeClr val="accent3"/>
-            </a:solidFill>
-            <a:prstDash val="solid"/>
-            <a:round/>
-            <a:headEnd type="none" w="med" len="med"/>
-            <a:tailEnd type="none" w="med" len="med"/>
-          </a:ln>
-        </p:spPr>
-      </p:cxnSp>
       <p:sp>
         <p:nvSpPr>
           <p:cNvPr id="47" name="Google Shape;2450;p41">
@@ -23722,7 +23692,7 @@
         </p:nvSpPr>
         <p:spPr>
           <a:xfrm>
-            <a:off x="3654365" y="2154001"/>
+            <a:off x="3655115" y="2208941"/>
             <a:ext cx="1827900" cy="1671000"/>
           </a:xfrm>
           <a:prstGeom prst="rect">
@@ -23778,6 +23748,50 @@
               <a:buChar char="-"/>
             </a:pPr>
             <a:r>
+              <a:rPr lang="fr-FR" dirty="0" err="1"/>
+              <a:t>Back-end</a:t>
+            </a:r>
+            <a:r>
+              <a:rPr lang="fr-FR" dirty="0"/>
+              <a:t> cours.</a:t>
+            </a:r>
+          </a:p>
+          <a:p>
+            <a:pPr marL="171450" lvl="0" indent="-171450" algn="l" rtl="0">
+              <a:spcBef>
+                <a:spcPts val="0"/>
+              </a:spcBef>
+              <a:spcAft>
+                <a:spcPts val="0"/>
+              </a:spcAft>
+              <a:buFontTx/>
+              <a:buChar char="-"/>
+            </a:pPr>
+            <a:r>
+              <a:rPr lang="fr-FR" dirty="0"/>
+              <a:t>Raccord </a:t>
+            </a:r>
+            <a:r>
+              <a:rPr lang="fr-FR" dirty="0" err="1"/>
+              <a:t>back-end</a:t>
+            </a:r>
+            <a:r>
+              <a:rPr lang="fr-FR" dirty="0"/>
+              <a:t> cours et parse des cours.</a:t>
+            </a:r>
+          </a:p>
+          <a:p>
+            <a:pPr marL="171450" lvl="0" indent="-171450" algn="l" rtl="0">
+              <a:spcBef>
+                <a:spcPts val="0"/>
+              </a:spcBef>
+              <a:spcAft>
+                <a:spcPts val="0"/>
+              </a:spcAft>
+              <a:buFontTx/>
+              <a:buChar char="-"/>
+            </a:pPr>
+            <a:r>
               <a:rPr lang="fr-FR" dirty="0"/>
               <a:t>Controller cours.</a:t>
             </a:r>
@@ -23812,6 +23826,38 @@
             <a:r>
               <a:rPr lang="fr-FR" dirty="0"/>
               <a:t>Forum.</a:t>
+            </a:r>
+          </a:p>
+          <a:p>
+            <a:pPr marL="171450" lvl="0" indent="-171450" algn="l" rtl="0">
+              <a:spcBef>
+                <a:spcPts val="0"/>
+              </a:spcBef>
+              <a:spcAft>
+                <a:spcPts val="0"/>
+              </a:spcAft>
+              <a:buFontTx/>
+              <a:buChar char="-"/>
+            </a:pPr>
+            <a:r>
+              <a:rPr lang="fr-FR" dirty="0"/>
+              <a:t>Suppression de compte.</a:t>
+            </a:r>
+          </a:p>
+          <a:p>
+            <a:pPr marL="171450" lvl="0" indent="-171450" algn="l" rtl="0">
+              <a:spcBef>
+                <a:spcPts val="0"/>
+              </a:spcBef>
+              <a:spcAft>
+                <a:spcPts val="0"/>
+              </a:spcAft>
+              <a:buFontTx/>
+              <a:buChar char="-"/>
+            </a:pPr>
+            <a:r>
+              <a:rPr lang="fr-FR" dirty="0"/>
+              <a:t>QCM.</a:t>
             </a:r>
           </a:p>
         </p:txBody>
@@ -23893,7 +23939,7 @@
         </p:nvSpPr>
         <p:spPr>
           <a:xfrm>
-            <a:off x="3811652" y="1024065"/>
+            <a:off x="3714349" y="1028661"/>
             <a:ext cx="1629800" cy="792900"/>
           </a:xfrm>
           <a:prstGeom prst="rect">
@@ -24834,9 +24880,12 @@
               <a:rPr lang="fr-FR" dirty="0"/>
               <a:t>QCM.</a:t>
             </a:r>
-            <a:br>
-              <a:rPr lang="fr-FR" dirty="0"/>
-            </a:br>
+          </a:p>
+          <a:p>
+            <a:pPr marL="171450" indent="-171450">
+              <a:buFontTx/>
+              <a:buChar char="-"/>
+            </a:pPr>
             <a:r>
               <a:rPr lang="fr-FR" dirty="0"/>
               <a:t>Template de plusieurs classes.</a:t>
@@ -24844,6 +24893,40 @@
           </a:p>
         </p:txBody>
       </p:sp>
+      <p:cxnSp>
+        <p:nvCxnSpPr>
+          <p:cNvPr id="24" name="Google Shape;2452;p41">
+            <a:extLst>
+              <a:ext uri="{FF2B5EF4-FFF2-40B4-BE49-F238E27FC236}">
+                <a16:creationId xmlns:a16="http://schemas.microsoft.com/office/drawing/2014/main" id="{0A679AD7-32B2-4545-80CA-F6F2DDD30611}"/>
+              </a:ext>
+            </a:extLst>
+          </p:cNvPr>
+          <p:cNvCxnSpPr>
+            <a:cxnSpLocks/>
+          </p:cNvCxnSpPr>
+          <p:nvPr/>
+        </p:nvCxnSpPr>
+        <p:spPr>
+          <a:xfrm>
+            <a:off x="4500485" y="1803276"/>
+            <a:ext cx="0" cy="261900"/>
+          </a:xfrm>
+          <a:prstGeom prst="straightConnector1">
+            <a:avLst/>
+          </a:prstGeom>
+          <a:noFill/>
+          <a:ln w="9525" cap="flat" cmpd="sng">
+            <a:solidFill>
+              <a:schemeClr val="accent3"/>
+            </a:solidFill>
+            <a:prstDash val="solid"/>
+            <a:round/>
+            <a:headEnd type="none" w="med" len="med"/>
+            <a:tailEnd type="none" w="med" len="med"/>
+          </a:ln>
+        </p:spPr>
+      </p:cxnSp>
     </p:spTree>
     <p:extLst>
       <p:ext uri="{BB962C8B-B14F-4D97-AF65-F5344CB8AC3E}">

</xml_diff>